<commit_message>
added slide to power point
</commit_message>
<xml_diff>
--- a/Final Presentation.pptx
+++ b/Final Presentation.pptx
@@ -28,6 +28,21 @@
   </p:sldIdLst>
   <p:sldSz cx="9144000" cy="5143500" type="screen16x9"/>
   <p:notesSz cx="6858000" cy="9144000"/>
+  <p:embeddedFontLst>
+    <p:embeddedFont>
+      <p:font typeface="Book Antiqua" panose="02040602050305030304" pitchFamily="18" charset="0"/>
+      <p:regular r:id="rId20"/>
+      <p:bold r:id="rId21"/>
+      <p:italic r:id="rId22"/>
+      <p:boldItalic r:id="rId23"/>
+    </p:embeddedFont>
+    <p:embeddedFont>
+      <p:font typeface="Garamond" panose="02020404030301010803" pitchFamily="18" charset="0"/>
+      <p:regular r:id="rId24"/>
+      <p:bold r:id="rId25"/>
+      <p:italic r:id="rId26"/>
+    </p:embeddedFont>
+  </p:embeddedFontLst>
   <p:defaultTextStyle>
     <a:defPPr>
       <a:defRPr lang="en-US"/>
@@ -125,7 +140,18 @@
   </p:defaultTextStyle>
   <p:extLst>
     <p:ext uri="{EFAFB233-063F-42B5-8137-9DF3F51BA10A}">
-      <p15:sldGuideLst xmlns:p15="http://schemas.microsoft.com/office/powerpoint/2012/main" xmlns=""/>
+      <p15:sldGuideLst xmlns:p15="http://schemas.microsoft.com/office/powerpoint/2012/main">
+        <p15:guide id="1" orient="horz" pos="1620">
+          <p15:clr>
+            <a:srgbClr val="A4A3A4"/>
+          </p15:clr>
+        </p15:guide>
+        <p15:guide id="2" pos="2880">
+          <p15:clr>
+            <a:srgbClr val="A4A3A4"/>
+          </p15:clr>
+        </p15:guide>
+      </p15:sldGuideLst>
     </p:ext>
   </p:extLst>
 </p:presentation>
@@ -701,7 +727,7 @@
           <p:cNvPr id="2" name="Title 1">
             <a:extLst>
               <a:ext uri="{FF2B5EF4-FFF2-40B4-BE49-F238E27FC236}">
-                <a16:creationId xmlns:a16="http://schemas.microsoft.com/office/drawing/2014/main" xmlns="" id="{E4F233FF-541F-8043-9FB6-54DBDE68AE29}"/>
+                <a16:creationId xmlns:a16="http://schemas.microsoft.com/office/drawing/2014/main" id="{E4F233FF-541F-8043-9FB6-54DBDE68AE29}"/>
               </a:ext>
             </a:extLst>
           </p:cNvPr>
@@ -738,7 +764,7 @@
           <p:cNvPr id="3" name="Subtitle 2">
             <a:extLst>
               <a:ext uri="{FF2B5EF4-FFF2-40B4-BE49-F238E27FC236}">
-                <a16:creationId xmlns:a16="http://schemas.microsoft.com/office/drawing/2014/main" xmlns="" id="{71DB007D-CF42-E944-A523-10FB4148CC0A}"/>
+                <a16:creationId xmlns:a16="http://schemas.microsoft.com/office/drawing/2014/main" id="{71DB007D-CF42-E944-A523-10FB4148CC0A}"/>
               </a:ext>
             </a:extLst>
           </p:cNvPr>
@@ -808,7 +834,7 @@
           <p:cNvPr id="4" name="Date Placeholder 3">
             <a:extLst>
               <a:ext uri="{FF2B5EF4-FFF2-40B4-BE49-F238E27FC236}">
-                <a16:creationId xmlns:a16="http://schemas.microsoft.com/office/drawing/2014/main" xmlns="" id="{F3801819-1F6F-5445-8687-0FB2DD07A94D}"/>
+                <a16:creationId xmlns:a16="http://schemas.microsoft.com/office/drawing/2014/main" id="{F3801819-1F6F-5445-8687-0FB2DD07A94D}"/>
               </a:ext>
             </a:extLst>
           </p:cNvPr>
@@ -827,7 +853,7 @@
             <a:fld id="{9334D819-9F07-4261-B09B-9E467E5D9002}" type="datetimeFigureOut">
               <a:rPr lang="en-US" smtClean="0"/>
               <a:pPr/>
-              <a:t>12/13/18</a:t>
+              <a:t>12/13/2018</a:t>
             </a:fld>
             <a:endParaRPr lang="en-US" dirty="0"/>
           </a:p>
@@ -838,7 +864,7 @@
           <p:cNvPr id="5" name="Footer Placeholder 4">
             <a:extLst>
               <a:ext uri="{FF2B5EF4-FFF2-40B4-BE49-F238E27FC236}">
-                <a16:creationId xmlns:a16="http://schemas.microsoft.com/office/drawing/2014/main" xmlns="" id="{80FB5ABE-9301-6A41-BA74-A20D04011026}"/>
+                <a16:creationId xmlns:a16="http://schemas.microsoft.com/office/drawing/2014/main" id="{80FB5ABE-9301-6A41-BA74-A20D04011026}"/>
               </a:ext>
             </a:extLst>
           </p:cNvPr>
@@ -863,7 +889,7 @@
           <p:cNvPr id="6" name="Slide Number Placeholder 5">
             <a:extLst>
               <a:ext uri="{FF2B5EF4-FFF2-40B4-BE49-F238E27FC236}">
-                <a16:creationId xmlns:a16="http://schemas.microsoft.com/office/drawing/2014/main" xmlns="" id="{F5602D67-0E5A-BC44-B816-2078AAA1050C}"/>
+                <a16:creationId xmlns:a16="http://schemas.microsoft.com/office/drawing/2014/main" id="{F5602D67-0E5A-BC44-B816-2078AAA1050C}"/>
               </a:ext>
             </a:extLst>
           </p:cNvPr>
@@ -924,7 +950,7 @@
           <p:cNvPr id="2" name="Title 1">
             <a:extLst>
               <a:ext uri="{FF2B5EF4-FFF2-40B4-BE49-F238E27FC236}">
-                <a16:creationId xmlns:a16="http://schemas.microsoft.com/office/drawing/2014/main" xmlns="" id="{DED1084F-89B6-034E-875D-5E1C46E71196}"/>
+                <a16:creationId xmlns:a16="http://schemas.microsoft.com/office/drawing/2014/main" id="{DED1084F-89B6-034E-875D-5E1C46E71196}"/>
               </a:ext>
             </a:extLst>
           </p:cNvPr>
@@ -952,7 +978,7 @@
           <p:cNvPr id="3" name="Vertical Text Placeholder 2">
             <a:extLst>
               <a:ext uri="{FF2B5EF4-FFF2-40B4-BE49-F238E27FC236}">
-                <a16:creationId xmlns:a16="http://schemas.microsoft.com/office/drawing/2014/main" xmlns="" id="{33408A2D-8A79-2D49-AAE4-634B51CA65D0}"/>
+                <a16:creationId xmlns:a16="http://schemas.microsoft.com/office/drawing/2014/main" id="{33408A2D-8A79-2D49-AAE4-634B51CA65D0}"/>
               </a:ext>
             </a:extLst>
           </p:cNvPr>
@@ -1009,7 +1035,7 @@
           <p:cNvPr id="4" name="Date Placeholder 3">
             <a:extLst>
               <a:ext uri="{FF2B5EF4-FFF2-40B4-BE49-F238E27FC236}">
-                <a16:creationId xmlns:a16="http://schemas.microsoft.com/office/drawing/2014/main" xmlns="" id="{5D49D2FD-320D-8D40-873D-682DFAF19E73}"/>
+                <a16:creationId xmlns:a16="http://schemas.microsoft.com/office/drawing/2014/main" id="{5D49D2FD-320D-8D40-873D-682DFAF19E73}"/>
               </a:ext>
             </a:extLst>
           </p:cNvPr>
@@ -1028,7 +1054,7 @@
             <a:fld id="{9334D819-9F07-4261-B09B-9E467E5D9002}" type="datetimeFigureOut">
               <a:rPr lang="en-US" smtClean="0"/>
               <a:pPr/>
-              <a:t>12/13/18</a:t>
+              <a:t>12/13/2018</a:t>
             </a:fld>
             <a:endParaRPr lang="en-US" dirty="0"/>
           </a:p>
@@ -1039,7 +1065,7 @@
           <p:cNvPr id="5" name="Footer Placeholder 4">
             <a:extLst>
               <a:ext uri="{FF2B5EF4-FFF2-40B4-BE49-F238E27FC236}">
-                <a16:creationId xmlns:a16="http://schemas.microsoft.com/office/drawing/2014/main" xmlns="" id="{6207A395-7DB0-5E46-B139-C174C5EC09CD}"/>
+                <a16:creationId xmlns:a16="http://schemas.microsoft.com/office/drawing/2014/main" id="{6207A395-7DB0-5E46-B139-C174C5EC09CD}"/>
               </a:ext>
             </a:extLst>
           </p:cNvPr>
@@ -1064,7 +1090,7 @@
           <p:cNvPr id="6" name="Slide Number Placeholder 5">
             <a:extLst>
               <a:ext uri="{FF2B5EF4-FFF2-40B4-BE49-F238E27FC236}">
-                <a16:creationId xmlns:a16="http://schemas.microsoft.com/office/drawing/2014/main" xmlns="" id="{D4DB25A8-CAC8-F647-8F60-C4F8EC5D911D}"/>
+                <a16:creationId xmlns:a16="http://schemas.microsoft.com/office/drawing/2014/main" id="{D4DB25A8-CAC8-F647-8F60-C4F8EC5D911D}"/>
               </a:ext>
             </a:extLst>
           </p:cNvPr>
@@ -1125,7 +1151,7 @@
           <p:cNvPr id="2" name="Vertical Title 1">
             <a:extLst>
               <a:ext uri="{FF2B5EF4-FFF2-40B4-BE49-F238E27FC236}">
-                <a16:creationId xmlns:a16="http://schemas.microsoft.com/office/drawing/2014/main" xmlns="" id="{5CC388B5-7372-7349-9133-BE21F1AE3DF2}"/>
+                <a16:creationId xmlns:a16="http://schemas.microsoft.com/office/drawing/2014/main" id="{5CC388B5-7372-7349-9133-BE21F1AE3DF2}"/>
               </a:ext>
             </a:extLst>
           </p:cNvPr>
@@ -1158,7 +1184,7 @@
           <p:cNvPr id="3" name="Vertical Text Placeholder 2">
             <a:extLst>
               <a:ext uri="{FF2B5EF4-FFF2-40B4-BE49-F238E27FC236}">
-                <a16:creationId xmlns:a16="http://schemas.microsoft.com/office/drawing/2014/main" xmlns="" id="{FA1EB797-E539-1F4A-AFAD-EE9F73B6A728}"/>
+                <a16:creationId xmlns:a16="http://schemas.microsoft.com/office/drawing/2014/main" id="{FA1EB797-E539-1F4A-AFAD-EE9F73B6A728}"/>
               </a:ext>
             </a:extLst>
           </p:cNvPr>
@@ -1220,7 +1246,7 @@
           <p:cNvPr id="4" name="Date Placeholder 3">
             <a:extLst>
               <a:ext uri="{FF2B5EF4-FFF2-40B4-BE49-F238E27FC236}">
-                <a16:creationId xmlns:a16="http://schemas.microsoft.com/office/drawing/2014/main" xmlns="" id="{F96B8BE2-924F-FA44-BEC3-A2E4335AF29B}"/>
+                <a16:creationId xmlns:a16="http://schemas.microsoft.com/office/drawing/2014/main" id="{F96B8BE2-924F-FA44-BEC3-A2E4335AF29B}"/>
               </a:ext>
             </a:extLst>
           </p:cNvPr>
@@ -1239,7 +1265,7 @@
             <a:fld id="{9334D819-9F07-4261-B09B-9E467E5D9002}" type="datetimeFigureOut">
               <a:rPr lang="en-US" smtClean="0"/>
               <a:pPr/>
-              <a:t>12/13/18</a:t>
+              <a:t>12/13/2018</a:t>
             </a:fld>
             <a:endParaRPr lang="en-US" dirty="0"/>
           </a:p>
@@ -1250,7 +1276,7 @@
           <p:cNvPr id="5" name="Footer Placeholder 4">
             <a:extLst>
               <a:ext uri="{FF2B5EF4-FFF2-40B4-BE49-F238E27FC236}">
-                <a16:creationId xmlns:a16="http://schemas.microsoft.com/office/drawing/2014/main" xmlns="" id="{B677D5EA-4F84-DA48-87CE-35FD7969E69A}"/>
+                <a16:creationId xmlns:a16="http://schemas.microsoft.com/office/drawing/2014/main" id="{B677D5EA-4F84-DA48-87CE-35FD7969E69A}"/>
               </a:ext>
             </a:extLst>
           </p:cNvPr>
@@ -1275,7 +1301,7 @@
           <p:cNvPr id="6" name="Slide Number Placeholder 5">
             <a:extLst>
               <a:ext uri="{FF2B5EF4-FFF2-40B4-BE49-F238E27FC236}">
-                <a16:creationId xmlns:a16="http://schemas.microsoft.com/office/drawing/2014/main" xmlns="" id="{647E0DF6-50DF-D347-B6F4-995A382E90CC}"/>
+                <a16:creationId xmlns:a16="http://schemas.microsoft.com/office/drawing/2014/main" id="{647E0DF6-50DF-D347-B6F4-995A382E90CC}"/>
               </a:ext>
             </a:extLst>
           </p:cNvPr>
@@ -1713,7 +1739,7 @@
           <p:cNvPr id="2" name="Title 1">
             <a:extLst>
               <a:ext uri="{FF2B5EF4-FFF2-40B4-BE49-F238E27FC236}">
-                <a16:creationId xmlns:a16="http://schemas.microsoft.com/office/drawing/2014/main" xmlns="" id="{022D4059-202D-AD4D-8328-281DC14076FE}"/>
+                <a16:creationId xmlns:a16="http://schemas.microsoft.com/office/drawing/2014/main" id="{022D4059-202D-AD4D-8328-281DC14076FE}"/>
               </a:ext>
             </a:extLst>
           </p:cNvPr>
@@ -1741,7 +1767,7 @@
           <p:cNvPr id="3" name="Content Placeholder 2">
             <a:extLst>
               <a:ext uri="{FF2B5EF4-FFF2-40B4-BE49-F238E27FC236}">
-                <a16:creationId xmlns:a16="http://schemas.microsoft.com/office/drawing/2014/main" xmlns="" id="{2638087E-CAE0-0243-95AC-CE79474B4539}"/>
+                <a16:creationId xmlns:a16="http://schemas.microsoft.com/office/drawing/2014/main" id="{2638087E-CAE0-0243-95AC-CE79474B4539}"/>
               </a:ext>
             </a:extLst>
           </p:cNvPr>
@@ -1798,7 +1824,7 @@
           <p:cNvPr id="4" name="Date Placeholder 3">
             <a:extLst>
               <a:ext uri="{FF2B5EF4-FFF2-40B4-BE49-F238E27FC236}">
-                <a16:creationId xmlns:a16="http://schemas.microsoft.com/office/drawing/2014/main" xmlns="" id="{5F76290D-9354-9148-BC52-C3C89BB3DBC0}"/>
+                <a16:creationId xmlns:a16="http://schemas.microsoft.com/office/drawing/2014/main" id="{5F76290D-9354-9148-BC52-C3C89BB3DBC0}"/>
               </a:ext>
             </a:extLst>
           </p:cNvPr>
@@ -1817,7 +1843,7 @@
             <a:fld id="{9334D819-9F07-4261-B09B-9E467E5D9002}" type="datetimeFigureOut">
               <a:rPr lang="en-US" smtClean="0"/>
               <a:pPr/>
-              <a:t>12/13/18</a:t>
+              <a:t>12/13/2018</a:t>
             </a:fld>
             <a:endParaRPr lang="en-US" dirty="0"/>
           </a:p>
@@ -1828,7 +1854,7 @@
           <p:cNvPr id="5" name="Footer Placeholder 4">
             <a:extLst>
               <a:ext uri="{FF2B5EF4-FFF2-40B4-BE49-F238E27FC236}">
-                <a16:creationId xmlns:a16="http://schemas.microsoft.com/office/drawing/2014/main" xmlns="" id="{B2AEE0A3-1240-9B48-8B16-7C9B47AF2BF7}"/>
+                <a16:creationId xmlns:a16="http://schemas.microsoft.com/office/drawing/2014/main" id="{B2AEE0A3-1240-9B48-8B16-7C9B47AF2BF7}"/>
               </a:ext>
             </a:extLst>
           </p:cNvPr>
@@ -1853,7 +1879,7 @@
           <p:cNvPr id="6" name="Slide Number Placeholder 5">
             <a:extLst>
               <a:ext uri="{FF2B5EF4-FFF2-40B4-BE49-F238E27FC236}">
-                <a16:creationId xmlns:a16="http://schemas.microsoft.com/office/drawing/2014/main" xmlns="" id="{5BD81F4E-B8C9-824B-BCAE-CA05676149AB}"/>
+                <a16:creationId xmlns:a16="http://schemas.microsoft.com/office/drawing/2014/main" id="{5BD81F4E-B8C9-824B-BCAE-CA05676149AB}"/>
               </a:ext>
             </a:extLst>
           </p:cNvPr>
@@ -1914,7 +1940,7 @@
           <p:cNvPr id="2" name="Title 1">
             <a:extLst>
               <a:ext uri="{FF2B5EF4-FFF2-40B4-BE49-F238E27FC236}">
-                <a16:creationId xmlns:a16="http://schemas.microsoft.com/office/drawing/2014/main" xmlns="" id="{D2A324AA-E0BD-5446-BFFE-264BBF362D61}"/>
+                <a16:creationId xmlns:a16="http://schemas.microsoft.com/office/drawing/2014/main" id="{D2A324AA-E0BD-5446-BFFE-264BBF362D61}"/>
               </a:ext>
             </a:extLst>
           </p:cNvPr>
@@ -1951,7 +1977,7 @@
           <p:cNvPr id="3" name="Text Placeholder 2">
             <a:extLst>
               <a:ext uri="{FF2B5EF4-FFF2-40B4-BE49-F238E27FC236}">
-                <a16:creationId xmlns:a16="http://schemas.microsoft.com/office/drawing/2014/main" xmlns="" id="{621AAFCA-2793-464E-93B6-66903947E2AB}"/>
+                <a16:creationId xmlns:a16="http://schemas.microsoft.com/office/drawing/2014/main" id="{621AAFCA-2793-464E-93B6-66903947E2AB}"/>
               </a:ext>
             </a:extLst>
           </p:cNvPr>
@@ -2076,7 +2102,7 @@
           <p:cNvPr id="4" name="Date Placeholder 3">
             <a:extLst>
               <a:ext uri="{FF2B5EF4-FFF2-40B4-BE49-F238E27FC236}">
-                <a16:creationId xmlns:a16="http://schemas.microsoft.com/office/drawing/2014/main" xmlns="" id="{CC412511-ECE8-F741-B2B2-0D11254D0086}"/>
+                <a16:creationId xmlns:a16="http://schemas.microsoft.com/office/drawing/2014/main" id="{CC412511-ECE8-F741-B2B2-0D11254D0086}"/>
               </a:ext>
             </a:extLst>
           </p:cNvPr>
@@ -2095,7 +2121,7 @@
             <a:fld id="{9334D819-9F07-4261-B09B-9E467E5D9002}" type="datetimeFigureOut">
               <a:rPr lang="en-US" smtClean="0"/>
               <a:pPr/>
-              <a:t>12/13/18</a:t>
+              <a:t>12/13/2018</a:t>
             </a:fld>
             <a:endParaRPr lang="en-US" dirty="0"/>
           </a:p>
@@ -2106,7 +2132,7 @@
           <p:cNvPr id="5" name="Footer Placeholder 4">
             <a:extLst>
               <a:ext uri="{FF2B5EF4-FFF2-40B4-BE49-F238E27FC236}">
-                <a16:creationId xmlns:a16="http://schemas.microsoft.com/office/drawing/2014/main" xmlns="" id="{7B62E8BF-2279-9E4A-A32D-96147CD506B9}"/>
+                <a16:creationId xmlns:a16="http://schemas.microsoft.com/office/drawing/2014/main" id="{7B62E8BF-2279-9E4A-A32D-96147CD506B9}"/>
               </a:ext>
             </a:extLst>
           </p:cNvPr>
@@ -2131,7 +2157,7 @@
           <p:cNvPr id="6" name="Slide Number Placeholder 5">
             <a:extLst>
               <a:ext uri="{FF2B5EF4-FFF2-40B4-BE49-F238E27FC236}">
-                <a16:creationId xmlns:a16="http://schemas.microsoft.com/office/drawing/2014/main" xmlns="" id="{171018D6-9451-F944-A3DF-B504159D1361}"/>
+                <a16:creationId xmlns:a16="http://schemas.microsoft.com/office/drawing/2014/main" id="{171018D6-9451-F944-A3DF-B504159D1361}"/>
               </a:ext>
             </a:extLst>
           </p:cNvPr>
@@ -2192,7 +2218,7 @@
           <p:cNvPr id="2" name="Title 1">
             <a:extLst>
               <a:ext uri="{FF2B5EF4-FFF2-40B4-BE49-F238E27FC236}">
-                <a16:creationId xmlns:a16="http://schemas.microsoft.com/office/drawing/2014/main" xmlns="" id="{C053483B-146C-1F41-9F57-1DE035E0E476}"/>
+                <a16:creationId xmlns:a16="http://schemas.microsoft.com/office/drawing/2014/main" id="{C053483B-146C-1F41-9F57-1DE035E0E476}"/>
               </a:ext>
             </a:extLst>
           </p:cNvPr>
@@ -2220,7 +2246,7 @@
           <p:cNvPr id="3" name="Content Placeholder 2">
             <a:extLst>
               <a:ext uri="{FF2B5EF4-FFF2-40B4-BE49-F238E27FC236}">
-                <a16:creationId xmlns:a16="http://schemas.microsoft.com/office/drawing/2014/main" xmlns="" id="{03EBA4F4-EFF8-BE48-9DE5-A3E9A1918601}"/>
+                <a16:creationId xmlns:a16="http://schemas.microsoft.com/office/drawing/2014/main" id="{03EBA4F4-EFF8-BE48-9DE5-A3E9A1918601}"/>
               </a:ext>
             </a:extLst>
           </p:cNvPr>
@@ -2282,7 +2308,7 @@
           <p:cNvPr id="4" name="Content Placeholder 3">
             <a:extLst>
               <a:ext uri="{FF2B5EF4-FFF2-40B4-BE49-F238E27FC236}">
-                <a16:creationId xmlns:a16="http://schemas.microsoft.com/office/drawing/2014/main" xmlns="" id="{2767E271-34F6-6649-ACA4-1ABCA7091C24}"/>
+                <a16:creationId xmlns:a16="http://schemas.microsoft.com/office/drawing/2014/main" id="{2767E271-34F6-6649-ACA4-1ABCA7091C24}"/>
               </a:ext>
             </a:extLst>
           </p:cNvPr>
@@ -2344,7 +2370,7 @@
           <p:cNvPr id="5" name="Date Placeholder 4">
             <a:extLst>
               <a:ext uri="{FF2B5EF4-FFF2-40B4-BE49-F238E27FC236}">
-                <a16:creationId xmlns:a16="http://schemas.microsoft.com/office/drawing/2014/main" xmlns="" id="{5C645A5B-A556-2645-97B4-A575F3997A75}"/>
+                <a16:creationId xmlns:a16="http://schemas.microsoft.com/office/drawing/2014/main" id="{5C645A5B-A556-2645-97B4-A575F3997A75}"/>
               </a:ext>
             </a:extLst>
           </p:cNvPr>
@@ -2363,7 +2389,7 @@
             <a:fld id="{9334D819-9F07-4261-B09B-9E467E5D9002}" type="datetimeFigureOut">
               <a:rPr lang="en-US" smtClean="0"/>
               <a:pPr/>
-              <a:t>12/13/18</a:t>
+              <a:t>12/13/2018</a:t>
             </a:fld>
             <a:endParaRPr lang="en-US" dirty="0"/>
           </a:p>
@@ -2374,7 +2400,7 @@
           <p:cNvPr id="6" name="Footer Placeholder 5">
             <a:extLst>
               <a:ext uri="{FF2B5EF4-FFF2-40B4-BE49-F238E27FC236}">
-                <a16:creationId xmlns:a16="http://schemas.microsoft.com/office/drawing/2014/main" xmlns="" id="{BBA1FA04-7211-294C-BDBD-20C25FD5D6B1}"/>
+                <a16:creationId xmlns:a16="http://schemas.microsoft.com/office/drawing/2014/main" id="{BBA1FA04-7211-294C-BDBD-20C25FD5D6B1}"/>
               </a:ext>
             </a:extLst>
           </p:cNvPr>
@@ -2399,7 +2425,7 @@
           <p:cNvPr id="7" name="Slide Number Placeholder 6">
             <a:extLst>
               <a:ext uri="{FF2B5EF4-FFF2-40B4-BE49-F238E27FC236}">
-                <a16:creationId xmlns:a16="http://schemas.microsoft.com/office/drawing/2014/main" xmlns="" id="{E6EEACBB-7ED0-C841-9FB2-927899E54701}"/>
+                <a16:creationId xmlns:a16="http://schemas.microsoft.com/office/drawing/2014/main" id="{E6EEACBB-7ED0-C841-9FB2-927899E54701}"/>
               </a:ext>
             </a:extLst>
           </p:cNvPr>
@@ -2460,7 +2486,7 @@
           <p:cNvPr id="2" name="Title 1">
             <a:extLst>
               <a:ext uri="{FF2B5EF4-FFF2-40B4-BE49-F238E27FC236}">
-                <a16:creationId xmlns:a16="http://schemas.microsoft.com/office/drawing/2014/main" xmlns="" id="{E749241D-C6EB-E749-9B66-C3FD44D96FBE}"/>
+                <a16:creationId xmlns:a16="http://schemas.microsoft.com/office/drawing/2014/main" id="{E749241D-C6EB-E749-9B66-C3FD44D96FBE}"/>
               </a:ext>
             </a:extLst>
           </p:cNvPr>
@@ -2493,7 +2519,7 @@
           <p:cNvPr id="3" name="Text Placeholder 2">
             <a:extLst>
               <a:ext uri="{FF2B5EF4-FFF2-40B4-BE49-F238E27FC236}">
-                <a16:creationId xmlns:a16="http://schemas.microsoft.com/office/drawing/2014/main" xmlns="" id="{D09B9CF6-FA7C-CA41-A86B-59415E903C1A}"/>
+                <a16:creationId xmlns:a16="http://schemas.microsoft.com/office/drawing/2014/main" id="{D09B9CF6-FA7C-CA41-A86B-59415E903C1A}"/>
               </a:ext>
             </a:extLst>
           </p:cNvPr>
@@ -2564,7 +2590,7 @@
           <p:cNvPr id="4" name="Content Placeholder 3">
             <a:extLst>
               <a:ext uri="{FF2B5EF4-FFF2-40B4-BE49-F238E27FC236}">
-                <a16:creationId xmlns:a16="http://schemas.microsoft.com/office/drawing/2014/main" xmlns="" id="{CB1857A8-F72D-6A4A-9FFC-8D2A7C0A8D2D}"/>
+                <a16:creationId xmlns:a16="http://schemas.microsoft.com/office/drawing/2014/main" id="{CB1857A8-F72D-6A4A-9FFC-8D2A7C0A8D2D}"/>
               </a:ext>
             </a:extLst>
           </p:cNvPr>
@@ -2626,7 +2652,7 @@
           <p:cNvPr id="5" name="Text Placeholder 4">
             <a:extLst>
               <a:ext uri="{FF2B5EF4-FFF2-40B4-BE49-F238E27FC236}">
-                <a16:creationId xmlns:a16="http://schemas.microsoft.com/office/drawing/2014/main" xmlns="" id="{D7AA9C37-EFC2-1A4D-9777-35F90F9E6DA9}"/>
+                <a16:creationId xmlns:a16="http://schemas.microsoft.com/office/drawing/2014/main" id="{D7AA9C37-EFC2-1A4D-9777-35F90F9E6DA9}"/>
               </a:ext>
             </a:extLst>
           </p:cNvPr>
@@ -2697,7 +2723,7 @@
           <p:cNvPr id="6" name="Content Placeholder 5">
             <a:extLst>
               <a:ext uri="{FF2B5EF4-FFF2-40B4-BE49-F238E27FC236}">
-                <a16:creationId xmlns:a16="http://schemas.microsoft.com/office/drawing/2014/main" xmlns="" id="{A6F1378C-D073-D940-8DDB-5B7B66911D2D}"/>
+                <a16:creationId xmlns:a16="http://schemas.microsoft.com/office/drawing/2014/main" id="{A6F1378C-D073-D940-8DDB-5B7B66911D2D}"/>
               </a:ext>
             </a:extLst>
           </p:cNvPr>
@@ -2759,7 +2785,7 @@
           <p:cNvPr id="7" name="Date Placeholder 6">
             <a:extLst>
               <a:ext uri="{FF2B5EF4-FFF2-40B4-BE49-F238E27FC236}">
-                <a16:creationId xmlns:a16="http://schemas.microsoft.com/office/drawing/2014/main" xmlns="" id="{7E608AF3-3F6F-4846-B941-3A8B5A92B484}"/>
+                <a16:creationId xmlns:a16="http://schemas.microsoft.com/office/drawing/2014/main" id="{7E608AF3-3F6F-4846-B941-3A8B5A92B484}"/>
               </a:ext>
             </a:extLst>
           </p:cNvPr>
@@ -2778,7 +2804,7 @@
             <a:fld id="{9334D819-9F07-4261-B09B-9E467E5D9002}" type="datetimeFigureOut">
               <a:rPr lang="en-US" smtClean="0"/>
               <a:pPr/>
-              <a:t>12/13/18</a:t>
+              <a:t>12/13/2018</a:t>
             </a:fld>
             <a:endParaRPr lang="en-US" dirty="0"/>
           </a:p>
@@ -2789,7 +2815,7 @@
           <p:cNvPr id="8" name="Footer Placeholder 7">
             <a:extLst>
               <a:ext uri="{FF2B5EF4-FFF2-40B4-BE49-F238E27FC236}">
-                <a16:creationId xmlns:a16="http://schemas.microsoft.com/office/drawing/2014/main" xmlns="" id="{AC5E9E54-B346-694A-AA73-1A1D5042411B}"/>
+                <a16:creationId xmlns:a16="http://schemas.microsoft.com/office/drawing/2014/main" id="{AC5E9E54-B346-694A-AA73-1A1D5042411B}"/>
               </a:ext>
             </a:extLst>
           </p:cNvPr>
@@ -2814,7 +2840,7 @@
           <p:cNvPr id="9" name="Slide Number Placeholder 8">
             <a:extLst>
               <a:ext uri="{FF2B5EF4-FFF2-40B4-BE49-F238E27FC236}">
-                <a16:creationId xmlns:a16="http://schemas.microsoft.com/office/drawing/2014/main" xmlns="" id="{232D3A64-972E-354A-9311-BF592C5B5175}"/>
+                <a16:creationId xmlns:a16="http://schemas.microsoft.com/office/drawing/2014/main" id="{232D3A64-972E-354A-9311-BF592C5B5175}"/>
               </a:ext>
             </a:extLst>
           </p:cNvPr>
@@ -2875,7 +2901,7 @@
           <p:cNvPr id="2" name="Title 1">
             <a:extLst>
               <a:ext uri="{FF2B5EF4-FFF2-40B4-BE49-F238E27FC236}">
-                <a16:creationId xmlns:a16="http://schemas.microsoft.com/office/drawing/2014/main" xmlns="" id="{78F0DFBB-9D45-914B-A4D3-1ACE4F22B37D}"/>
+                <a16:creationId xmlns:a16="http://schemas.microsoft.com/office/drawing/2014/main" id="{78F0DFBB-9D45-914B-A4D3-1ACE4F22B37D}"/>
               </a:ext>
             </a:extLst>
           </p:cNvPr>
@@ -2903,7 +2929,7 @@
           <p:cNvPr id="3" name="Date Placeholder 2">
             <a:extLst>
               <a:ext uri="{FF2B5EF4-FFF2-40B4-BE49-F238E27FC236}">
-                <a16:creationId xmlns:a16="http://schemas.microsoft.com/office/drawing/2014/main" xmlns="" id="{5A5809DF-81AD-EC42-AF80-80EE014B411B}"/>
+                <a16:creationId xmlns:a16="http://schemas.microsoft.com/office/drawing/2014/main" id="{5A5809DF-81AD-EC42-AF80-80EE014B411B}"/>
               </a:ext>
             </a:extLst>
           </p:cNvPr>
@@ -2921,7 +2947,7 @@
           <a:p>
             <a:fld id="{9334D819-9F07-4261-B09B-9E467E5D9002}" type="datetimeFigureOut">
               <a:rPr lang="en-US" smtClean="0"/>
-              <a:t>12/13/18</a:t>
+              <a:t>12/13/2018</a:t>
             </a:fld>
             <a:endParaRPr lang="en-US" dirty="0"/>
           </a:p>
@@ -2932,7 +2958,7 @@
           <p:cNvPr id="4" name="Footer Placeholder 3">
             <a:extLst>
               <a:ext uri="{FF2B5EF4-FFF2-40B4-BE49-F238E27FC236}">
-                <a16:creationId xmlns:a16="http://schemas.microsoft.com/office/drawing/2014/main" xmlns="" id="{6E29086B-021B-F54A-83C4-8F4A0AFE510C}"/>
+                <a16:creationId xmlns:a16="http://schemas.microsoft.com/office/drawing/2014/main" id="{6E29086B-021B-F54A-83C4-8F4A0AFE510C}"/>
               </a:ext>
             </a:extLst>
           </p:cNvPr>
@@ -2957,7 +2983,7 @@
           <p:cNvPr id="5" name="Slide Number Placeholder 4">
             <a:extLst>
               <a:ext uri="{FF2B5EF4-FFF2-40B4-BE49-F238E27FC236}">
-                <a16:creationId xmlns:a16="http://schemas.microsoft.com/office/drawing/2014/main" xmlns="" id="{7F2740DA-2728-584E-A6B3-4DD341E764A4}"/>
+                <a16:creationId xmlns:a16="http://schemas.microsoft.com/office/drawing/2014/main" id="{7F2740DA-2728-584E-A6B3-4DD341E764A4}"/>
               </a:ext>
             </a:extLst>
           </p:cNvPr>
@@ -3017,7 +3043,7 @@
           <p:cNvPr id="2" name="Date Placeholder 1">
             <a:extLst>
               <a:ext uri="{FF2B5EF4-FFF2-40B4-BE49-F238E27FC236}">
-                <a16:creationId xmlns:a16="http://schemas.microsoft.com/office/drawing/2014/main" xmlns="" id="{8BA43404-7AEF-AC41-B7A0-50B10D6AB9FB}"/>
+                <a16:creationId xmlns:a16="http://schemas.microsoft.com/office/drawing/2014/main" id="{8BA43404-7AEF-AC41-B7A0-50B10D6AB9FB}"/>
               </a:ext>
             </a:extLst>
           </p:cNvPr>
@@ -3035,7 +3061,7 @@
           <a:p>
             <a:fld id="{9334D819-9F07-4261-B09B-9E467E5D9002}" type="datetimeFigureOut">
               <a:rPr lang="en-US" smtClean="0"/>
-              <a:t>12/13/18</a:t>
+              <a:t>12/13/2018</a:t>
             </a:fld>
             <a:endParaRPr lang="en-US" dirty="0"/>
           </a:p>
@@ -3046,7 +3072,7 @@
           <p:cNvPr id="3" name="Footer Placeholder 2">
             <a:extLst>
               <a:ext uri="{FF2B5EF4-FFF2-40B4-BE49-F238E27FC236}">
-                <a16:creationId xmlns:a16="http://schemas.microsoft.com/office/drawing/2014/main" xmlns="" id="{80A89044-13CC-4941-AD5E-5125CEF63B36}"/>
+                <a16:creationId xmlns:a16="http://schemas.microsoft.com/office/drawing/2014/main" id="{80A89044-13CC-4941-AD5E-5125CEF63B36}"/>
               </a:ext>
             </a:extLst>
           </p:cNvPr>
@@ -3071,7 +3097,7 @@
           <p:cNvPr id="4" name="Slide Number Placeholder 3">
             <a:extLst>
               <a:ext uri="{FF2B5EF4-FFF2-40B4-BE49-F238E27FC236}">
-                <a16:creationId xmlns:a16="http://schemas.microsoft.com/office/drawing/2014/main" xmlns="" id="{E1E2303E-6C03-954F-A693-FABC76A2AFBA}"/>
+                <a16:creationId xmlns:a16="http://schemas.microsoft.com/office/drawing/2014/main" id="{E1E2303E-6C03-954F-A693-FABC76A2AFBA}"/>
               </a:ext>
             </a:extLst>
           </p:cNvPr>
@@ -3131,7 +3157,7 @@
           <p:cNvPr id="2" name="Title 1">
             <a:extLst>
               <a:ext uri="{FF2B5EF4-FFF2-40B4-BE49-F238E27FC236}">
-                <a16:creationId xmlns:a16="http://schemas.microsoft.com/office/drawing/2014/main" xmlns="" id="{6C91D7F9-6614-8047-841F-949571758BD1}"/>
+                <a16:creationId xmlns:a16="http://schemas.microsoft.com/office/drawing/2014/main" id="{6C91D7F9-6614-8047-841F-949571758BD1}"/>
               </a:ext>
             </a:extLst>
           </p:cNvPr>
@@ -3168,7 +3194,7 @@
           <p:cNvPr id="3" name="Content Placeholder 2">
             <a:extLst>
               <a:ext uri="{FF2B5EF4-FFF2-40B4-BE49-F238E27FC236}">
-                <a16:creationId xmlns:a16="http://schemas.microsoft.com/office/drawing/2014/main" xmlns="" id="{D3CC5A5A-ADAD-AC4D-BE7C-C3AD11F3ED47}"/>
+                <a16:creationId xmlns:a16="http://schemas.microsoft.com/office/drawing/2014/main" id="{D3CC5A5A-ADAD-AC4D-BE7C-C3AD11F3ED47}"/>
               </a:ext>
             </a:extLst>
           </p:cNvPr>
@@ -3258,7 +3284,7 @@
           <p:cNvPr id="4" name="Text Placeholder 3">
             <a:extLst>
               <a:ext uri="{FF2B5EF4-FFF2-40B4-BE49-F238E27FC236}">
-                <a16:creationId xmlns:a16="http://schemas.microsoft.com/office/drawing/2014/main" xmlns="" id="{B62E6928-D90C-5C46-956F-BC399BE2D58C}"/>
+                <a16:creationId xmlns:a16="http://schemas.microsoft.com/office/drawing/2014/main" id="{B62E6928-D90C-5C46-956F-BC399BE2D58C}"/>
               </a:ext>
             </a:extLst>
           </p:cNvPr>
@@ -3329,7 +3355,7 @@
           <p:cNvPr id="5" name="Date Placeholder 4">
             <a:extLst>
               <a:ext uri="{FF2B5EF4-FFF2-40B4-BE49-F238E27FC236}">
-                <a16:creationId xmlns:a16="http://schemas.microsoft.com/office/drawing/2014/main" xmlns="" id="{6FD05A64-3460-0440-83E6-FDA7ED730796}"/>
+                <a16:creationId xmlns:a16="http://schemas.microsoft.com/office/drawing/2014/main" id="{6FD05A64-3460-0440-83E6-FDA7ED730796}"/>
               </a:ext>
             </a:extLst>
           </p:cNvPr>
@@ -3348,7 +3374,7 @@
             <a:fld id="{9334D819-9F07-4261-B09B-9E467E5D9002}" type="datetimeFigureOut">
               <a:rPr lang="en-US" smtClean="0"/>
               <a:pPr/>
-              <a:t>12/13/18</a:t>
+              <a:t>12/13/2018</a:t>
             </a:fld>
             <a:endParaRPr lang="en-US" dirty="0"/>
           </a:p>
@@ -3359,7 +3385,7 @@
           <p:cNvPr id="6" name="Footer Placeholder 5">
             <a:extLst>
               <a:ext uri="{FF2B5EF4-FFF2-40B4-BE49-F238E27FC236}">
-                <a16:creationId xmlns:a16="http://schemas.microsoft.com/office/drawing/2014/main" xmlns="" id="{CFC4CBE5-C961-BB4D-BB94-CDA19525F3B2}"/>
+                <a16:creationId xmlns:a16="http://schemas.microsoft.com/office/drawing/2014/main" id="{CFC4CBE5-C961-BB4D-BB94-CDA19525F3B2}"/>
               </a:ext>
             </a:extLst>
           </p:cNvPr>
@@ -3384,7 +3410,7 @@
           <p:cNvPr id="7" name="Slide Number Placeholder 6">
             <a:extLst>
               <a:ext uri="{FF2B5EF4-FFF2-40B4-BE49-F238E27FC236}">
-                <a16:creationId xmlns:a16="http://schemas.microsoft.com/office/drawing/2014/main" xmlns="" id="{4712824A-A63C-6D4E-A40E-92E7ACE619B3}"/>
+                <a16:creationId xmlns:a16="http://schemas.microsoft.com/office/drawing/2014/main" id="{4712824A-A63C-6D4E-A40E-92E7ACE619B3}"/>
               </a:ext>
             </a:extLst>
           </p:cNvPr>
@@ -3445,7 +3471,7 @@
           <p:cNvPr id="2" name="Title 1">
             <a:extLst>
               <a:ext uri="{FF2B5EF4-FFF2-40B4-BE49-F238E27FC236}">
-                <a16:creationId xmlns:a16="http://schemas.microsoft.com/office/drawing/2014/main" xmlns="" id="{0400060C-2140-C64E-93C3-2365411D7D60}"/>
+                <a16:creationId xmlns:a16="http://schemas.microsoft.com/office/drawing/2014/main" id="{0400060C-2140-C64E-93C3-2365411D7D60}"/>
               </a:ext>
             </a:extLst>
           </p:cNvPr>
@@ -3482,7 +3508,7 @@
           <p:cNvPr id="3" name="Picture Placeholder 2">
             <a:extLst>
               <a:ext uri="{FF2B5EF4-FFF2-40B4-BE49-F238E27FC236}">
-                <a16:creationId xmlns:a16="http://schemas.microsoft.com/office/drawing/2014/main" xmlns="" id="{831A0ED4-410F-7940-A1E7-6BF789F01555}"/>
+                <a16:creationId xmlns:a16="http://schemas.microsoft.com/office/drawing/2014/main" id="{831A0ED4-410F-7940-A1E7-6BF789F01555}"/>
               </a:ext>
             </a:extLst>
           </p:cNvPr>
@@ -3549,7 +3575,7 @@
           <p:cNvPr id="4" name="Text Placeholder 3">
             <a:extLst>
               <a:ext uri="{FF2B5EF4-FFF2-40B4-BE49-F238E27FC236}">
-                <a16:creationId xmlns:a16="http://schemas.microsoft.com/office/drawing/2014/main" xmlns="" id="{1318883F-CB28-1649-887D-107AA5E50431}"/>
+                <a16:creationId xmlns:a16="http://schemas.microsoft.com/office/drawing/2014/main" id="{1318883F-CB28-1649-887D-107AA5E50431}"/>
               </a:ext>
             </a:extLst>
           </p:cNvPr>
@@ -3620,7 +3646,7 @@
           <p:cNvPr id="5" name="Date Placeholder 4">
             <a:extLst>
               <a:ext uri="{FF2B5EF4-FFF2-40B4-BE49-F238E27FC236}">
-                <a16:creationId xmlns:a16="http://schemas.microsoft.com/office/drawing/2014/main" xmlns="" id="{E10F6159-0717-2848-A029-362964B840DC}"/>
+                <a16:creationId xmlns:a16="http://schemas.microsoft.com/office/drawing/2014/main" id="{E10F6159-0717-2848-A029-362964B840DC}"/>
               </a:ext>
             </a:extLst>
           </p:cNvPr>
@@ -3638,7 +3664,7 @@
           <a:p>
             <a:fld id="{9334D819-9F07-4261-B09B-9E467E5D9002}" type="datetimeFigureOut">
               <a:rPr lang="en-US" smtClean="0"/>
-              <a:t>12/13/18</a:t>
+              <a:t>12/13/2018</a:t>
             </a:fld>
             <a:endParaRPr lang="en-US" dirty="0"/>
           </a:p>
@@ -3649,7 +3675,7 @@
           <p:cNvPr id="6" name="Footer Placeholder 5">
             <a:extLst>
               <a:ext uri="{FF2B5EF4-FFF2-40B4-BE49-F238E27FC236}">
-                <a16:creationId xmlns:a16="http://schemas.microsoft.com/office/drawing/2014/main" xmlns="" id="{DF4F2621-5C92-4A43-BCD6-BD5C0ECB26BB}"/>
+                <a16:creationId xmlns:a16="http://schemas.microsoft.com/office/drawing/2014/main" id="{DF4F2621-5C92-4A43-BCD6-BD5C0ECB26BB}"/>
               </a:ext>
             </a:extLst>
           </p:cNvPr>
@@ -3674,7 +3700,7 @@
           <p:cNvPr id="7" name="Slide Number Placeholder 6">
             <a:extLst>
               <a:ext uri="{FF2B5EF4-FFF2-40B4-BE49-F238E27FC236}">
-                <a16:creationId xmlns:a16="http://schemas.microsoft.com/office/drawing/2014/main" xmlns="" id="{08252E1D-9BDB-F640-A7E4-84119B0D88CB}"/>
+                <a16:creationId xmlns:a16="http://schemas.microsoft.com/office/drawing/2014/main" id="{08252E1D-9BDB-F640-A7E4-84119B0D88CB}"/>
               </a:ext>
             </a:extLst>
           </p:cNvPr>
@@ -3739,7 +3765,7 @@
           <p:cNvPr id="2" name="Title Placeholder 1">
             <a:extLst>
               <a:ext uri="{FF2B5EF4-FFF2-40B4-BE49-F238E27FC236}">
-                <a16:creationId xmlns:a16="http://schemas.microsoft.com/office/drawing/2014/main" xmlns="" id="{6BB4A1F1-4E32-8749-A5A3-9FBABCB2F32C}"/>
+                <a16:creationId xmlns:a16="http://schemas.microsoft.com/office/drawing/2014/main" id="{6BB4A1F1-4E32-8749-A5A3-9FBABCB2F32C}"/>
               </a:ext>
             </a:extLst>
           </p:cNvPr>
@@ -3777,7 +3803,7 @@
           <p:cNvPr id="3" name="Text Placeholder 2">
             <a:extLst>
               <a:ext uri="{FF2B5EF4-FFF2-40B4-BE49-F238E27FC236}">
-                <a16:creationId xmlns:a16="http://schemas.microsoft.com/office/drawing/2014/main" xmlns="" id="{C2150FEC-6CED-3F45-9A92-783928510E6D}"/>
+                <a16:creationId xmlns:a16="http://schemas.microsoft.com/office/drawing/2014/main" id="{C2150FEC-6CED-3F45-9A92-783928510E6D}"/>
               </a:ext>
             </a:extLst>
           </p:cNvPr>
@@ -3844,7 +3870,7 @@
           <p:cNvPr id="4" name="Date Placeholder 3">
             <a:extLst>
               <a:ext uri="{FF2B5EF4-FFF2-40B4-BE49-F238E27FC236}">
-                <a16:creationId xmlns:a16="http://schemas.microsoft.com/office/drawing/2014/main" xmlns="" id="{0AF579F8-F8F8-3343-9BEB-8D3D4850A7C6}"/>
+                <a16:creationId xmlns:a16="http://schemas.microsoft.com/office/drawing/2014/main" id="{0AF579F8-F8F8-3343-9BEB-8D3D4850A7C6}"/>
               </a:ext>
             </a:extLst>
           </p:cNvPr>
@@ -3881,7 +3907,7 @@
             <a:fld id="{9334D819-9F07-4261-B09B-9E467E5D9002}" type="datetimeFigureOut">
               <a:rPr lang="en-US" smtClean="0"/>
               <a:pPr/>
-              <a:t>12/13/18</a:t>
+              <a:t>12/13/2018</a:t>
             </a:fld>
             <a:endParaRPr lang="en-US" dirty="0"/>
           </a:p>
@@ -3892,7 +3918,7 @@
           <p:cNvPr id="5" name="Footer Placeholder 4">
             <a:extLst>
               <a:ext uri="{FF2B5EF4-FFF2-40B4-BE49-F238E27FC236}">
-                <a16:creationId xmlns:a16="http://schemas.microsoft.com/office/drawing/2014/main" xmlns="" id="{1856C49E-4FF8-0549-8800-747012AF82A4}"/>
+                <a16:creationId xmlns:a16="http://schemas.microsoft.com/office/drawing/2014/main" id="{1856C49E-4FF8-0549-8800-747012AF82A4}"/>
               </a:ext>
             </a:extLst>
           </p:cNvPr>
@@ -3935,7 +3961,7 @@
           <p:cNvPr id="6" name="Slide Number Placeholder 5">
             <a:extLst>
               <a:ext uri="{FF2B5EF4-FFF2-40B4-BE49-F238E27FC236}">
-                <a16:creationId xmlns:a16="http://schemas.microsoft.com/office/drawing/2014/main" xmlns="" id="{6A708117-C184-C54C-ABC5-39698B02DC67}"/>
+                <a16:creationId xmlns:a16="http://schemas.microsoft.com/office/drawing/2014/main" id="{6A708117-C184-C54C-ABC5-39698B02DC67}"/>
               </a:ext>
             </a:extLst>
           </p:cNvPr>
@@ -4001,7 +4027,7 @@
     <p:sldLayoutId id="2147484028" r:id="rId12"/>
     <p:sldLayoutId id="2147484029" r:id="rId13"/>
   </p:sldLayoutIdLst>
-  <p:transition xmlns:p14="http://schemas.microsoft.com/office/powerpoint/2010/main">
+  <p:transition>
     <p:fade thruBlk="1"/>
   </p:transition>
   <p:hf sldNum="0" hdr="0" ftr="0" dt="0"/>
@@ -4287,7 +4313,7 @@
   </p:txStyles>
   <p:extLst>
     <p:ext uri="{27BBF7A9-308A-43DC-89C8-2F10F3537804}">
-      <p15:sldGuideLst xmlns:p15="http://schemas.microsoft.com/office/powerpoint/2012/main" xmlns=""/>
+      <p15:sldGuideLst xmlns:p15="http://schemas.microsoft.com/office/powerpoint/2012/main"/>
     </p:ext>
   </p:extLst>
 </p:sldMaster>
@@ -4413,7 +4439,7 @@
           <p:cNvPr id="3" name="Picture 2" descr="A picture containing clipart&#10;&#10;Description automatically generated">
             <a:extLst>
               <a:ext uri="{FF2B5EF4-FFF2-40B4-BE49-F238E27FC236}">
-                <a16:creationId xmlns:a16="http://schemas.microsoft.com/office/drawing/2014/main" xmlns="" id="{B9BF54BB-3E26-4B4B-91C8-D996F588DE0C}"/>
+                <a16:creationId xmlns:a16="http://schemas.microsoft.com/office/drawing/2014/main" id="{B9BF54BB-3E26-4B4B-91C8-D996F588DE0C}"/>
               </a:ext>
             </a:extLst>
           </p:cNvPr>
@@ -4497,7 +4523,7 @@
           <p:cNvPr id="2" name="Text Placeholder 1">
             <a:extLst>
               <a:ext uri="{FF2B5EF4-FFF2-40B4-BE49-F238E27FC236}">
-                <a16:creationId xmlns:a16="http://schemas.microsoft.com/office/drawing/2014/main" xmlns="" id="{A1A32C11-FA9B-F642-9D57-A45977CB22D7}"/>
+                <a16:creationId xmlns:a16="http://schemas.microsoft.com/office/drawing/2014/main" id="{A1A32C11-FA9B-F642-9D57-A45977CB22D7}"/>
               </a:ext>
             </a:extLst>
           </p:cNvPr>
@@ -4596,7 +4622,7 @@
           <p:cNvPr id="2" name="Text Placeholder 1">
             <a:extLst>
               <a:ext uri="{FF2B5EF4-FFF2-40B4-BE49-F238E27FC236}">
-                <a16:creationId xmlns:a16="http://schemas.microsoft.com/office/drawing/2014/main" xmlns="" id="{A1A32C11-FA9B-F642-9D57-A45977CB22D7}"/>
+                <a16:creationId xmlns:a16="http://schemas.microsoft.com/office/drawing/2014/main" id="{A1A32C11-FA9B-F642-9D57-A45977CB22D7}"/>
               </a:ext>
             </a:extLst>
           </p:cNvPr>
@@ -4695,7 +4721,7 @@
           <p:cNvPr id="2" name="Text Placeholder 1">
             <a:extLst>
               <a:ext uri="{FF2B5EF4-FFF2-40B4-BE49-F238E27FC236}">
-                <a16:creationId xmlns:a16="http://schemas.microsoft.com/office/drawing/2014/main" xmlns="" id="{A1A32C11-FA9B-F642-9D57-A45977CB22D7}"/>
+                <a16:creationId xmlns:a16="http://schemas.microsoft.com/office/drawing/2014/main" id="{A1A32C11-FA9B-F642-9D57-A45977CB22D7}"/>
               </a:ext>
             </a:extLst>
           </p:cNvPr>
@@ -4794,7 +4820,7 @@
           <p:cNvPr id="2" name="Text Placeholder 1">
             <a:extLst>
               <a:ext uri="{FF2B5EF4-FFF2-40B4-BE49-F238E27FC236}">
-                <a16:creationId xmlns:a16="http://schemas.microsoft.com/office/drawing/2014/main" xmlns="" id="{A1A32C11-FA9B-F642-9D57-A45977CB22D7}"/>
+                <a16:creationId xmlns:a16="http://schemas.microsoft.com/office/drawing/2014/main" id="{A1A32C11-FA9B-F642-9D57-A45977CB22D7}"/>
               </a:ext>
             </a:extLst>
           </p:cNvPr>
@@ -4894,7 +4920,7 @@
           <p:cNvPr id="2" name="Text Placeholder 1">
             <a:extLst>
               <a:ext uri="{FF2B5EF4-FFF2-40B4-BE49-F238E27FC236}">
-                <a16:creationId xmlns:a16="http://schemas.microsoft.com/office/drawing/2014/main" xmlns="" id="{A1A32C11-FA9B-F642-9D57-A45977CB22D7}"/>
+                <a16:creationId xmlns:a16="http://schemas.microsoft.com/office/drawing/2014/main" id="{A1A32C11-FA9B-F642-9D57-A45977CB22D7}"/>
               </a:ext>
             </a:extLst>
           </p:cNvPr>
@@ -4981,7 +5007,7 @@
         </p:blipFill>
         <p:spPr>
           <a:xfrm>
-            <a:off x="2448928" y="1208860"/>
+            <a:off x="2233999" y="1007757"/>
             <a:ext cx="4298016" cy="3579209"/>
           </a:xfrm>
           <a:prstGeom prst="rect">
@@ -5078,10 +5104,9 @@
           <a:lstStyle/>
           <a:p>
             <a:r>
-              <a:rPr lang="en-US" dirty="0" smtClean="0"/>
+              <a:rPr lang="en-US" dirty="0"/>
               <a:t>Loyal</a:t>
             </a:r>
-            <a:endParaRPr lang="en-US" dirty="0"/>
           </a:p>
         </p:txBody>
       </p:sp>
@@ -5108,10 +5133,9 @@
           <a:lstStyle/>
           <a:p>
             <a:r>
-              <a:rPr lang="en-US" dirty="0" smtClean="0"/>
+              <a:rPr lang="en-US" dirty="0"/>
               <a:t>Disloyal</a:t>
             </a:r>
-            <a:endParaRPr lang="en-US" dirty="0"/>
           </a:p>
         </p:txBody>
       </p:sp>
@@ -5258,10 +5282,9 @@
           <a:lstStyle/>
           <a:p>
             <a:r>
-              <a:rPr lang="en-US" dirty="0" smtClean="0"/>
+              <a:rPr lang="en-US" dirty="0"/>
               <a:t>Random Forest</a:t>
             </a:r>
-            <a:endParaRPr lang="en-US" dirty="0"/>
           </a:p>
         </p:txBody>
       </p:sp>
@@ -5289,10 +5312,9 @@
           <a:p>
             <a:pPr algn="ctr"/>
             <a:r>
-              <a:rPr lang="en-US" dirty="0" smtClean="0"/>
+              <a:rPr lang="en-US" dirty="0"/>
               <a:t>Decision Tree</a:t>
             </a:r>
-            <a:endParaRPr lang="en-US" dirty="0"/>
           </a:p>
         </p:txBody>
       </p:sp>
@@ -5320,10 +5342,9 @@
           <a:p>
             <a:pPr algn="ctr"/>
             <a:r>
-              <a:rPr lang="en-US" dirty="0" smtClean="0"/>
+              <a:rPr lang="en-US" dirty="0"/>
               <a:t>Logistic Regression</a:t>
             </a:r>
-            <a:endParaRPr lang="en-US" dirty="0"/>
           </a:p>
         </p:txBody>
       </p:sp>
@@ -5391,7 +5412,7 @@
           <p:cNvPr id="2" name="Text Placeholder 1">
             <a:extLst>
               <a:ext uri="{FF2B5EF4-FFF2-40B4-BE49-F238E27FC236}">
-                <a16:creationId xmlns:a16="http://schemas.microsoft.com/office/drawing/2014/main" xmlns="" id="{A1A32C11-FA9B-F642-9D57-A45977CB22D7}"/>
+                <a16:creationId xmlns:a16="http://schemas.microsoft.com/office/drawing/2014/main" id="{A1A32C11-FA9B-F642-9D57-A45977CB22D7}"/>
               </a:ext>
             </a:extLst>
           </p:cNvPr>
@@ -5472,7 +5493,7 @@
           <p:cNvPr id="4" name="Picture 3" descr="A view of a city at night&#10;&#10;Description automatically generated">
             <a:extLst>
               <a:ext uri="{FF2B5EF4-FFF2-40B4-BE49-F238E27FC236}">
-                <a16:creationId xmlns:a16="http://schemas.microsoft.com/office/drawing/2014/main" xmlns="" id="{92CA63BC-A4A5-5E4A-A8F6-461D447F7AC5}"/>
+                <a16:creationId xmlns:a16="http://schemas.microsoft.com/office/drawing/2014/main" id="{92CA63BC-A4A5-5E4A-A8F6-461D447F7AC5}"/>
               </a:ext>
             </a:extLst>
           </p:cNvPr>
@@ -5561,7 +5582,7 @@
           <p:cNvPr id="4" name="Rectangle 3">
             <a:extLst>
               <a:ext uri="{FF2B5EF4-FFF2-40B4-BE49-F238E27FC236}">
-                <a16:creationId xmlns:a16="http://schemas.microsoft.com/office/drawing/2014/main" xmlns="" id="{9D5873E0-B366-A24E-BCCE-169162FB1748}"/>
+                <a16:creationId xmlns:a16="http://schemas.microsoft.com/office/drawing/2014/main" id="{9D5873E0-B366-A24E-BCCE-169162FB1748}"/>
               </a:ext>
             </a:extLst>
           </p:cNvPr>
@@ -5601,7 +5622,7 @@
           <p:cNvPr id="7" name="Rectangle 6">
             <a:extLst>
               <a:ext uri="{FF2B5EF4-FFF2-40B4-BE49-F238E27FC236}">
-                <a16:creationId xmlns:a16="http://schemas.microsoft.com/office/drawing/2014/main" xmlns="" id="{C53C882F-AE06-8F4F-9925-4532E73D2CA4}"/>
+                <a16:creationId xmlns:a16="http://schemas.microsoft.com/office/drawing/2014/main" id="{C53C882F-AE06-8F4F-9925-4532E73D2CA4}"/>
               </a:ext>
             </a:extLst>
           </p:cNvPr>
@@ -5755,7 +5776,7 @@
           <p:cNvPr id="2" name="Text Placeholder 1">
             <a:extLst>
               <a:ext uri="{FF2B5EF4-FFF2-40B4-BE49-F238E27FC236}">
-                <a16:creationId xmlns:a16="http://schemas.microsoft.com/office/drawing/2014/main" xmlns="" id="{71E86C48-B157-4F49-BA24-E10141B8320E}"/>
+                <a16:creationId xmlns:a16="http://schemas.microsoft.com/office/drawing/2014/main" id="{71E86C48-B157-4F49-BA24-E10141B8320E}"/>
               </a:ext>
             </a:extLst>
           </p:cNvPr>
@@ -5970,7 +5991,7 @@
           <p:cNvPr id="2" name="Text Placeholder 1">
             <a:extLst>
               <a:ext uri="{FF2B5EF4-FFF2-40B4-BE49-F238E27FC236}">
-                <a16:creationId xmlns:a16="http://schemas.microsoft.com/office/drawing/2014/main" xmlns="" id="{4802F9B2-4487-6D4D-86AA-D65AD667A0D0}"/>
+                <a16:creationId xmlns:a16="http://schemas.microsoft.com/office/drawing/2014/main" id="{4802F9B2-4487-6D4D-86AA-D65AD667A0D0}"/>
               </a:ext>
             </a:extLst>
           </p:cNvPr>
@@ -6006,7 +6027,7 @@
           <p:cNvPr id="3" name="TextBox 2">
             <a:extLst>
               <a:ext uri="{FF2B5EF4-FFF2-40B4-BE49-F238E27FC236}">
-                <a16:creationId xmlns:a16="http://schemas.microsoft.com/office/drawing/2014/main" xmlns="" id="{0051C20A-7462-F54E-8B37-87C39A88C868}"/>
+                <a16:creationId xmlns:a16="http://schemas.microsoft.com/office/drawing/2014/main" id="{0051C20A-7462-F54E-8B37-87C39A88C868}"/>
               </a:ext>
             </a:extLst>
           </p:cNvPr>
@@ -6233,7 +6254,7 @@
           <p:cNvPr id="2" name="Text Placeholder 1">
             <a:extLst>
               <a:ext uri="{FF2B5EF4-FFF2-40B4-BE49-F238E27FC236}">
-                <a16:creationId xmlns:a16="http://schemas.microsoft.com/office/drawing/2014/main" xmlns="" id="{E6939A2B-0865-B444-AD11-56928761EBDB}"/>
+                <a16:creationId xmlns:a16="http://schemas.microsoft.com/office/drawing/2014/main" id="{E6939A2B-0865-B444-AD11-56928761EBDB}"/>
               </a:ext>
             </a:extLst>
           </p:cNvPr>
@@ -6328,7 +6349,7 @@
           <p:cNvPr id="2" name="Text Placeholder 1">
             <a:extLst>
               <a:ext uri="{FF2B5EF4-FFF2-40B4-BE49-F238E27FC236}">
-                <a16:creationId xmlns:a16="http://schemas.microsoft.com/office/drawing/2014/main" xmlns="" id="{A1A32C11-FA9B-F642-9D57-A45977CB22D7}"/>
+                <a16:creationId xmlns:a16="http://schemas.microsoft.com/office/drawing/2014/main" id="{A1A32C11-FA9B-F642-9D57-A45977CB22D7}"/>
               </a:ext>
             </a:extLst>
           </p:cNvPr>
@@ -6426,7 +6447,7 @@
           <p:cNvPr id="2" name="Text Placeholder 1">
             <a:extLst>
               <a:ext uri="{FF2B5EF4-FFF2-40B4-BE49-F238E27FC236}">
-                <a16:creationId xmlns:a16="http://schemas.microsoft.com/office/drawing/2014/main" xmlns="" id="{A1A32C11-FA9B-F642-9D57-A45977CB22D7}"/>
+                <a16:creationId xmlns:a16="http://schemas.microsoft.com/office/drawing/2014/main" id="{A1A32C11-FA9B-F642-9D57-A45977CB22D7}"/>
               </a:ext>
             </a:extLst>
           </p:cNvPr>
@@ -6439,7 +6460,7 @@
         </p:nvSpPr>
         <p:spPr>
           <a:xfrm>
-            <a:off x="373346" y="187857"/>
+            <a:off x="234381" y="8567"/>
             <a:ext cx="6104100" cy="819900"/>
           </a:xfrm>
         </p:spPr>
@@ -6454,11 +6475,180 @@
               <a:rPr lang="en-US" sz="3200" dirty="0">
                 <a:latin typeface="Book Antiqua" panose="02040602050305030304" pitchFamily="18" charset="0"/>
               </a:rPr>
-              <a:t>Principle Component Analysis</a:t>
-            </a:r>
-          </a:p>
-        </p:txBody>
-      </p:sp>
+              <a:t>Neural Network</a:t>
+            </a:r>
+          </a:p>
+        </p:txBody>
+      </p:sp>
+      <p:sp>
+        <p:nvSpPr>
+          <p:cNvPr id="3" name="TextBox 2">
+            <a:extLst>
+              <a:ext uri="{FF2B5EF4-FFF2-40B4-BE49-F238E27FC236}">
+                <a16:creationId xmlns:a16="http://schemas.microsoft.com/office/drawing/2014/main" id="{3646F57E-13A4-452C-A71E-69CE0ABBB7DC}"/>
+              </a:ext>
+            </a:extLst>
+          </p:cNvPr>
+          <p:cNvSpPr txBox="1"/>
+          <p:nvPr/>
+        </p:nvSpPr>
+        <p:spPr>
+          <a:xfrm>
+            <a:off x="149394" y="828467"/>
+            <a:ext cx="5372222" cy="4524315"/>
+          </a:xfrm>
+          <a:prstGeom prst="rect">
+            <a:avLst/>
+          </a:prstGeom>
+          <a:noFill/>
+        </p:spPr>
+        <p:txBody>
+          <a:bodyPr wrap="square" rtlCol="0">
+            <a:spAutoFit/>
+          </a:bodyPr>
+          <a:lstStyle/>
+          <a:p>
+            <a:pPr marL="285750" indent="-285750">
+              <a:buFont typeface="Arial" panose="020B0604020202020204" pitchFamily="34" charset="0"/>
+              <a:buChar char="•"/>
+            </a:pPr>
+            <a:r>
+              <a:rPr lang="en-US" dirty="0"/>
+              <a:t>Binned target results based on “Loyal” and “Disloyal” scores</a:t>
+            </a:r>
+          </a:p>
+          <a:p>
+            <a:pPr marL="285750" indent="-285750">
+              <a:buFont typeface="Arial" panose="020B0604020202020204" pitchFamily="34" charset="0"/>
+              <a:buChar char="•"/>
+            </a:pPr>
+            <a:r>
+              <a:rPr lang="en-US" dirty="0"/>
+              <a:t>Scaled data to range between 1 and 0</a:t>
+            </a:r>
+          </a:p>
+          <a:p>
+            <a:pPr marL="285750" indent="-285750">
+              <a:buFont typeface="Arial" panose="020B0604020202020204" pitchFamily="34" charset="0"/>
+              <a:buChar char="•"/>
+            </a:pPr>
+            <a:r>
+              <a:rPr lang="en-US" dirty="0"/>
+              <a:t>Did a principal component analysis to determine most variance in the data and to make network easier to run.</a:t>
+            </a:r>
+          </a:p>
+          <a:p>
+            <a:pPr marL="285750" indent="-285750">
+              <a:buFont typeface="Arial" panose="020B0604020202020204" pitchFamily="34" charset="0"/>
+              <a:buChar char="•"/>
+            </a:pPr>
+            <a:r>
+              <a:rPr lang="en-US" dirty="0"/>
+              <a:t>Ran Neural Network, achieved a accuracy of 0.</a:t>
+            </a:r>
+          </a:p>
+          <a:p>
+            <a:pPr marL="285750" indent="-285750">
+              <a:buFont typeface="Arial" panose="020B0604020202020204" pitchFamily="34" charset="0"/>
+              <a:buChar char="•"/>
+            </a:pPr>
+            <a:endParaRPr lang="en-US" dirty="0"/>
+          </a:p>
+          <a:p>
+            <a:r>
+              <a:rPr lang="en-US" dirty="0"/>
+              <a:t>Conclusion:</a:t>
+            </a:r>
+          </a:p>
+          <a:p>
+            <a:r>
+              <a:rPr lang="en-US" dirty="0"/>
+              <a:t>	</a:t>
+            </a:r>
+          </a:p>
+          <a:p>
+            <a:r>
+              <a:rPr lang="en-US" dirty="0"/>
+              <a:t>This is a complex dataset that may require multiple kinds of models working in synchrony to make accurate predictions.</a:t>
+            </a:r>
+          </a:p>
+          <a:p>
+            <a:pPr marL="285750" indent="-285750">
+              <a:buFont typeface="Arial" panose="020B0604020202020204" pitchFamily="34" charset="0"/>
+              <a:buChar char="•"/>
+            </a:pPr>
+            <a:endParaRPr lang="en-US" dirty="0"/>
+          </a:p>
+          <a:p>
+            <a:pPr marL="285750" indent="-285750">
+              <a:buFont typeface="Arial" panose="020B0604020202020204" pitchFamily="34" charset="0"/>
+              <a:buChar char="•"/>
+            </a:pPr>
+            <a:endParaRPr lang="en-US" dirty="0"/>
+          </a:p>
+          <a:p>
+            <a:pPr marL="285750" indent="-285750">
+              <a:buFont typeface="Arial" panose="020B0604020202020204" pitchFamily="34" charset="0"/>
+              <a:buChar char="•"/>
+            </a:pPr>
+            <a:endParaRPr lang="en-US" dirty="0"/>
+          </a:p>
+          <a:p>
+            <a:pPr marL="285750" indent="-285750">
+              <a:buFont typeface="Arial" panose="020B0604020202020204" pitchFamily="34" charset="0"/>
+              <a:buChar char="•"/>
+            </a:pPr>
+            <a:endParaRPr lang="en-US" dirty="0"/>
+          </a:p>
+        </p:txBody>
+      </p:sp>
+      <p:pic>
+        <p:nvPicPr>
+          <p:cNvPr id="1030" name="Picture 6" descr="Image result for neural network">
+            <a:extLst>
+              <a:ext uri="{FF2B5EF4-FFF2-40B4-BE49-F238E27FC236}">
+                <a16:creationId xmlns:a16="http://schemas.microsoft.com/office/drawing/2014/main" id="{A4A4BC3D-7721-4D94-A8D3-6FF3A41EB2E4}"/>
+              </a:ext>
+            </a:extLst>
+          </p:cNvPr>
+          <p:cNvPicPr>
+            <a:picLocks noChangeAspect="1" noChangeArrowheads="1"/>
+          </p:cNvPicPr>
+          <p:nvPr/>
+        </p:nvPicPr>
+        <p:blipFill>
+          <a:blip r:embed="rId2">
+            <a:extLst>
+              <a:ext uri="{28A0092B-C50C-407E-A947-70E740481C1C}">
+                <a14:useLocalDpi xmlns:a14="http://schemas.microsoft.com/office/drawing/2010/main" val="0"/>
+              </a:ext>
+            </a:extLst>
+          </a:blip>
+          <a:srcRect/>
+          <a:stretch>
+            <a:fillRect/>
+          </a:stretch>
+        </p:blipFill>
+        <p:spPr bwMode="auto">
+          <a:xfrm>
+            <a:off x="5521616" y="988998"/>
+            <a:ext cx="3622384" cy="2718391"/>
+          </a:xfrm>
+          <a:prstGeom prst="rect">
+            <a:avLst/>
+          </a:prstGeom>
+          <a:noFill/>
+          <a:extLst>
+            <a:ext uri="{909E8E84-426E-40DD-AFC4-6F175D3DCCD1}">
+              <a14:hiddenFill xmlns:a14="http://schemas.microsoft.com/office/drawing/2010/main">
+                <a:solidFill>
+                  <a:srgbClr val="FFFFFF"/>
+                </a:solidFill>
+              </a14:hiddenFill>
+            </a:ext>
+          </a:extLst>
+        </p:spPr>
+      </p:pic>
     </p:spTree>
     <p:extLst>
       <p:ext uri="{BB962C8B-B14F-4D97-AF65-F5344CB8AC3E}">
@@ -6523,7 +6713,7 @@
           <p:cNvPr id="2" name="Text Placeholder 1">
             <a:extLst>
               <a:ext uri="{FF2B5EF4-FFF2-40B4-BE49-F238E27FC236}">
-                <a16:creationId xmlns:a16="http://schemas.microsoft.com/office/drawing/2014/main" xmlns="" id="{A1A32C11-FA9B-F642-9D57-A45977CB22D7}"/>
+                <a16:creationId xmlns:a16="http://schemas.microsoft.com/office/drawing/2014/main" id="{A1A32C11-FA9B-F642-9D57-A45977CB22D7}"/>
               </a:ext>
             </a:extLst>
           </p:cNvPr>
@@ -6622,7 +6812,7 @@
           <p:cNvPr id="2" name="Text Placeholder 1">
             <a:extLst>
               <a:ext uri="{FF2B5EF4-FFF2-40B4-BE49-F238E27FC236}">
-                <a16:creationId xmlns:a16="http://schemas.microsoft.com/office/drawing/2014/main" xmlns="" id="{A1A32C11-FA9B-F642-9D57-A45977CB22D7}"/>
+                <a16:creationId xmlns:a16="http://schemas.microsoft.com/office/drawing/2014/main" id="{A1A32C11-FA9B-F642-9D57-A45977CB22D7}"/>
               </a:ext>
             </a:extLst>
           </p:cNvPr>
@@ -6925,7 +7115,7 @@
   <a:extraClrSchemeLst/>
   <a:extLst>
     <a:ext uri="{05A4C25C-085E-4340-85A3-A5531E510DB2}">
-      <thm15:themeFamily xmlns:thm15="http://schemas.microsoft.com/office/thememl/2012/main" xmlns="" name="Office Theme" id="{62F939B6-93AF-4DB8-9C6B-D6C7DFDC589F}" vid="{4A3C46E8-61CC-4603-A589-7422A47A8E4A}"/>
+      <thm15:themeFamily xmlns:thm15="http://schemas.microsoft.com/office/thememl/2012/main" name="Office Theme" id="{62F939B6-93AF-4DB8-9C6B-D6C7DFDC589F}" vid="{4A3C46E8-61CC-4603-A589-7422A47A8E4A}"/>
     </a:ext>
   </a:extLst>
 </a:theme>

</xml_diff>

<commit_message>
finished neural network slide
</commit_message>
<xml_diff>
--- a/Final Presentation.pptx
+++ b/Final Presentation.pptx
@@ -5,7 +5,7 @@
     <p:sldMasterId id="2147484016" r:id="rId1"/>
   </p:sldMasterIdLst>
   <p:notesMasterIdLst>
-    <p:notesMasterId r:id="rId19"/>
+    <p:notesMasterId r:id="rId18"/>
   </p:notesMasterIdLst>
   <p:sldIdLst>
     <p:sldId id="256" r:id="rId2"/>
@@ -18,29 +18,28 @@
     <p:sldId id="265" r:id="rId9"/>
     <p:sldId id="266" r:id="rId10"/>
     <p:sldId id="267" r:id="rId11"/>
-    <p:sldId id="268" r:id="rId12"/>
-    <p:sldId id="269" r:id="rId13"/>
-    <p:sldId id="270" r:id="rId14"/>
-    <p:sldId id="273" r:id="rId15"/>
-    <p:sldId id="274" r:id="rId16"/>
-    <p:sldId id="271" r:id="rId17"/>
-    <p:sldId id="257" r:id="rId18"/>
+    <p:sldId id="269" r:id="rId12"/>
+    <p:sldId id="270" r:id="rId13"/>
+    <p:sldId id="273" r:id="rId14"/>
+    <p:sldId id="274" r:id="rId15"/>
+    <p:sldId id="271" r:id="rId16"/>
+    <p:sldId id="257" r:id="rId17"/>
   </p:sldIdLst>
   <p:sldSz cx="9144000" cy="5143500" type="screen16x9"/>
   <p:notesSz cx="6858000" cy="9144000"/>
   <p:embeddedFontLst>
     <p:embeddedFont>
       <p:font typeface="Book Antiqua" panose="02040602050305030304" pitchFamily="18" charset="0"/>
-      <p:regular r:id="rId20"/>
-      <p:bold r:id="rId21"/>
-      <p:italic r:id="rId22"/>
-      <p:boldItalic r:id="rId23"/>
+      <p:regular r:id="rId19"/>
+      <p:bold r:id="rId20"/>
+      <p:italic r:id="rId21"/>
+      <p:boldItalic r:id="rId22"/>
     </p:embeddedFont>
     <p:embeddedFont>
       <p:font typeface="Garamond" panose="02020404030301010803" pitchFamily="18" charset="0"/>
-      <p:regular r:id="rId24"/>
-      <p:bold r:id="rId25"/>
-      <p:italic r:id="rId26"/>
+      <p:regular r:id="rId23"/>
+      <p:bold r:id="rId24"/>
+      <p:italic r:id="rId25"/>
     </p:embeddedFont>
   </p:embeddedFontLst>
   <p:defaultTextStyle>
@@ -4635,8 +4634,8 @@
         </p:nvSpPr>
         <p:spPr>
           <a:xfrm>
-            <a:off x="373346" y="187857"/>
-            <a:ext cx="6104100" cy="819900"/>
+            <a:off x="373345" y="187857"/>
+            <a:ext cx="8219111" cy="819900"/>
           </a:xfrm>
         </p:spPr>
         <p:txBody>
@@ -4649,10 +4648,10 @@
               <a:buNone/>
             </a:pPr>
             <a:r>
-              <a:rPr lang="en-US" sz="3200" dirty="0">
+              <a:rPr lang="en-US" sz="2800" dirty="0">
                 <a:latin typeface="Book Antiqua" panose="02040602050305030304" pitchFamily="18" charset="0"/>
               </a:rPr>
-              <a:t>Neural Networks</a:t>
+              <a:t>LGBM (Light Gradient Boosting Machine)</a:t>
             </a:r>
           </a:p>
         </p:txBody>
@@ -4660,7 +4659,7 @@
     </p:spTree>
     <p:extLst>
       <p:ext uri="{BB962C8B-B14F-4D97-AF65-F5344CB8AC3E}">
-        <p14:creationId xmlns:p14="http://schemas.microsoft.com/office/powerpoint/2010/main" val="1630899489"/>
+        <p14:creationId xmlns:p14="http://schemas.microsoft.com/office/powerpoint/2010/main" val="2611029261"/>
       </p:ext>
     </p:extLst>
   </p:cSld>
@@ -4734,105 +4733,6 @@
         </p:nvSpPr>
         <p:spPr>
           <a:xfrm>
-            <a:off x="373345" y="187857"/>
-            <a:ext cx="8219111" cy="819900"/>
-          </a:xfrm>
-        </p:spPr>
-        <p:txBody>
-          <a:bodyPr>
-            <a:normAutofit/>
-          </a:bodyPr>
-          <a:lstStyle/>
-          <a:p>
-            <a:pPr marL="457200" lvl="1" indent="0" algn="l">
-              <a:buNone/>
-            </a:pPr>
-            <a:r>
-              <a:rPr lang="en-US" sz="2800" dirty="0">
-                <a:latin typeface="Book Antiqua" panose="02040602050305030304" pitchFamily="18" charset="0"/>
-              </a:rPr>
-              <a:t>LGBM (Light Gradient Boosting Machine)</a:t>
-            </a:r>
-          </a:p>
-        </p:txBody>
-      </p:sp>
-    </p:spTree>
-    <p:extLst>
-      <p:ext uri="{BB962C8B-B14F-4D97-AF65-F5344CB8AC3E}">
-        <p14:creationId xmlns:p14="http://schemas.microsoft.com/office/powerpoint/2010/main" val="2611029261"/>
-      </p:ext>
-    </p:extLst>
-  </p:cSld>
-  <p:clrMapOvr>
-    <a:masterClrMapping/>
-  </p:clrMapOvr>
-</p:sld>
-</file>
-
-<file path=ppt/slides/slide13.xml><?xml version="1.0" encoding="utf-8"?>
-<p:sld xmlns:a="http://schemas.openxmlformats.org/drawingml/2006/main" xmlns:r="http://schemas.openxmlformats.org/officeDocument/2006/relationships" xmlns:p="http://schemas.openxmlformats.org/presentationml/2006/main">
-  <p:cSld>
-    <p:bg>
-      <p:bgPr shadeToTitle="1">
-        <a:gradFill flip="none" rotWithShape="1">
-          <a:gsLst>
-            <a:gs pos="0">
-              <a:schemeClr val="bg2">
-                <a:tint val="84000"/>
-                <a:shade val="100000"/>
-                <a:hueMod val="92000"/>
-                <a:satMod val="180000"/>
-                <a:lumMod val="114000"/>
-              </a:schemeClr>
-            </a:gs>
-            <a:gs pos="100000">
-              <a:schemeClr val="bg2">
-                <a:shade val="92000"/>
-                <a:satMod val="170000"/>
-                <a:lumMod val="96000"/>
-              </a:schemeClr>
-            </a:gs>
-          </a:gsLst>
-          <a:path path="shape">
-            <a:fillToRect l="50000" t="50000" r="50000" b="50000"/>
-          </a:path>
-          <a:tileRect/>
-        </a:gradFill>
-        <a:effectLst/>
-      </p:bgPr>
-    </p:bg>
-    <p:spTree>
-      <p:nvGrpSpPr>
-        <p:cNvPr id="1" name=""/>
-        <p:cNvGrpSpPr/>
-        <p:nvPr/>
-      </p:nvGrpSpPr>
-      <p:grpSpPr>
-        <a:xfrm>
-          <a:off x="0" y="0"/>
-          <a:ext cx="0" cy="0"/>
-          <a:chOff x="0" y="0"/>
-          <a:chExt cx="0" cy="0"/>
-        </a:xfrm>
-      </p:grpSpPr>
-      <p:sp>
-        <p:nvSpPr>
-          <p:cNvPr id="2" name="Text Placeholder 1">
-            <a:extLst>
-              <a:ext uri="{FF2B5EF4-FFF2-40B4-BE49-F238E27FC236}">
-                <a16:creationId xmlns:a16="http://schemas.microsoft.com/office/drawing/2014/main" id="{A1A32C11-FA9B-F642-9D57-A45977CB22D7}"/>
-              </a:ext>
-            </a:extLst>
-          </p:cNvPr>
-          <p:cNvSpPr>
-            <a:spLocks noGrp="1"/>
-          </p:cNvSpPr>
-          <p:nvPr>
-            <p:ph type="body" idx="1"/>
-          </p:nvPr>
-        </p:nvSpPr>
-        <p:spPr>
-          <a:xfrm>
             <a:off x="373346" y="187857"/>
             <a:ext cx="6104100" cy="819900"/>
           </a:xfrm>
@@ -4898,7 +4798,7 @@
 </p:sld>
 </file>
 
-<file path=ppt/slides/slide14.xml><?xml version="1.0" encoding="utf-8"?>
+<file path=ppt/slides/slide13.xml><?xml version="1.0" encoding="utf-8"?>
 <p:sld xmlns:a="http://schemas.openxmlformats.org/drawingml/2006/main" xmlns:r="http://schemas.openxmlformats.org/officeDocument/2006/relationships" xmlns:p="http://schemas.openxmlformats.org/presentationml/2006/main">
   <p:cSld>
     <p:spTree>
@@ -5152,7 +5052,7 @@
 </p:sld>
 </file>
 
-<file path=ppt/slides/slide15.xml><?xml version="1.0" encoding="utf-8"?>
+<file path=ppt/slides/slide14.xml><?xml version="1.0" encoding="utf-8"?>
 <p:sld xmlns:a="http://schemas.openxmlformats.org/drawingml/2006/main" xmlns:r="http://schemas.openxmlformats.org/officeDocument/2006/relationships" xmlns:p="http://schemas.openxmlformats.org/presentationml/2006/main">
   <p:cSld>
     <p:spTree>
@@ -5361,7 +5261,7 @@
 </p:sld>
 </file>
 
-<file path=ppt/slides/slide16.xml><?xml version="1.0" encoding="utf-8"?>
+<file path=ppt/slides/slide15.xml><?xml version="1.0" encoding="utf-8"?>
 <p:sld xmlns:a="http://schemas.openxmlformats.org/drawingml/2006/main" xmlns:r="http://schemas.openxmlformats.org/officeDocument/2006/relationships" xmlns:p="http://schemas.openxmlformats.org/presentationml/2006/main">
   <p:cSld>
     <p:bg>
@@ -5460,7 +5360,7 @@
 </p:sld>
 </file>
 
-<file path=ppt/slides/slide17.xml><?xml version="1.0" encoding="utf-8"?>
+<file path=ppt/slides/slide16.xml><?xml version="1.0" encoding="utf-8"?>
 <p:sld xmlns:a="http://schemas.openxmlformats.org/drawingml/2006/main" xmlns:r="http://schemas.openxmlformats.org/officeDocument/2006/relationships" xmlns:p="http://schemas.openxmlformats.org/presentationml/2006/main" showMasterSp="0">
   <p:cSld>
     <p:bg>
@@ -6495,7 +6395,7 @@
         <p:spPr>
           <a:xfrm>
             <a:off x="149394" y="828467"/>
-            <a:ext cx="5372222" cy="4524315"/>
+            <a:ext cx="5372222" cy="5355312"/>
           </a:xfrm>
           <a:prstGeom prst="rect">
             <a:avLst/>
@@ -6514,7 +6414,7 @@
             </a:pPr>
             <a:r>
               <a:rPr lang="en-US" dirty="0"/>
-              <a:t>Binned target results based on “Loyal” and “Disloyal” scores</a:t>
+              <a:t>Encountered many issues with data as it was, so we needed to narrow down the important columns</a:t>
             </a:r>
           </a:p>
           <a:p>
@@ -6524,7 +6424,7 @@
             </a:pPr>
             <a:r>
               <a:rPr lang="en-US" dirty="0"/>
-              <a:t>Scaled data to range between 1 and 0</a:t>
+              <a:t>Binned target results based on “Loyal” and “Disloyal” scores</a:t>
             </a:r>
           </a:p>
           <a:p>
@@ -6534,7 +6434,17 @@
             </a:pPr>
             <a:r>
               <a:rPr lang="en-US" dirty="0"/>
-              <a:t>Did a principal component analysis to determine most variance in the data and to make network easier to run.</a:t>
+              <a:t>Scaled data to range between 1 and 0</a:t>
+            </a:r>
+          </a:p>
+          <a:p>
+            <a:pPr marL="285750" indent="-285750">
+              <a:buFont typeface="Arial" panose="020B0604020202020204" pitchFamily="34" charset="0"/>
+              <a:buChar char="•"/>
+            </a:pPr>
+            <a:r>
+              <a:rPr lang="en-US" dirty="0"/>
+              <a:t>Did a principal component analysis to determine most variance in the data and to make network easier to run, picked 50 columns that accounted for 95% of variance.</a:t>
             </a:r>
           </a:p>
           <a:p>
@@ -6557,13 +6467,7 @@
           <a:p>
             <a:r>
               <a:rPr lang="en-US" dirty="0"/>
-              <a:t>Conclusion:</a:t>
-            </a:r>
-          </a:p>
-          <a:p>
-            <a:r>
-              <a:rPr lang="en-US" dirty="0"/>
-              <a:t>	</a:t>
+              <a:t>Conclusion:	</a:t>
             </a:r>
           </a:p>
           <a:p>
@@ -6631,7 +6535,7 @@
         </p:blipFill>
         <p:spPr bwMode="auto">
           <a:xfrm>
-            <a:off x="5521616" y="988998"/>
+            <a:off x="5521616" y="78891"/>
             <a:ext cx="3622384" cy="2718391"/>
           </a:xfrm>
           <a:prstGeom prst="rect">
@@ -6647,6 +6551,36 @@
               </a14:hiddenFill>
             </a:ext>
           </a:extLst>
+        </p:spPr>
+      </p:pic>
+      <p:pic>
+        <p:nvPicPr>
+          <p:cNvPr id="5" name="Picture 4">
+            <a:extLst>
+              <a:ext uri="{FF2B5EF4-FFF2-40B4-BE49-F238E27FC236}">
+                <a16:creationId xmlns:a16="http://schemas.microsoft.com/office/drawing/2014/main" id="{C76A2AD1-BC68-491D-9039-165FAE9CCA95}"/>
+              </a:ext>
+            </a:extLst>
+          </p:cNvPr>
+          <p:cNvPicPr>
+            <a:picLocks noChangeAspect="1"/>
+          </p:cNvPicPr>
+          <p:nvPr/>
+        </p:nvPicPr>
+        <p:blipFill>
+          <a:blip r:embed="rId3"/>
+          <a:stretch>
+            <a:fillRect/>
+          </a:stretch>
+        </p:blipFill>
+        <p:spPr>
+          <a:xfrm>
+            <a:off x="5448930" y="3052056"/>
+            <a:ext cx="3767756" cy="2012553"/>
+          </a:xfrm>
+          <a:prstGeom prst="rect">
+            <a:avLst/>
+          </a:prstGeom>
         </p:spPr>
       </p:pic>
     </p:spTree>

</xml_diff>